<commit_message>
Added Worked Examples Chap 3
Added worked examples, not including videos to chapter 3
</commit_message>
<xml_diff>
--- a/Lecture Slides/VideoLectureSlides/3.2.pptx
+++ b/Lecture Slides/VideoLectureSlides/3.2.pptx
@@ -5,7 +5,7 @@
     <p:sldMasterId id="2147483660" r:id="rId4"/>
   </p:sldMasterIdLst>
   <p:notesMasterIdLst>
-    <p:notesMasterId r:id="rId12"/>
+    <p:notesMasterId r:id="rId13"/>
   </p:notesMasterIdLst>
   <p:sldIdLst>
     <p:sldId id="256" r:id="rId5"/>
@@ -15,6 +15,7 @@
     <p:sldId id="287" r:id="rId9"/>
     <p:sldId id="295" r:id="rId10"/>
     <p:sldId id="284" r:id="rId11"/>
+    <p:sldId id="296" r:id="rId12"/>
   </p:sldIdLst>
   <p:sldSz cx="9144000" cy="6858000" type="screen4x3"/>
   <p:notesSz cx="6858000" cy="9144000"/>
@@ -480,7 +481,7 @@
           <a:p>
             <a:fld id="{1AA1AB63-216F-4D5B-8811-CCB935E98D4A}" type="datetimeFigureOut">
               <a:rPr lang="en-US" smtClean="0"/>
-              <a:t>8/31/2020</a:t>
+              <a:t>8/30/2021</a:t>
             </a:fld>
             <a:endParaRPr lang="en-US"/>
           </a:p>
@@ -6851,7 +6852,7 @@
           <a:p>
             <a:r>
               <a:rPr lang="en-US" dirty="0"/>
-              <a:t>Determine the moment that 200 lb force shown below exerts about point B. </a:t>
+              <a:t>Use Varignon's Theorem to determine the moment that the force at point A exerts about point B.</a:t>
             </a:r>
           </a:p>
         </p:txBody>
@@ -6901,6 +6902,753 @@
     <p:extLst>
       <p:ext uri="{BB962C8B-B14F-4D97-AF65-F5344CB8AC3E}">
         <p14:creationId xmlns:p14="http://schemas.microsoft.com/office/powerpoint/2010/main" val="3805722981"/>
+      </p:ext>
+    </p:extLst>
+  </p:cSld>
+  <p:clrMapOvr>
+    <a:masterClrMapping/>
+  </p:clrMapOvr>
+</p:sld>
+</file>
+
+<file path=ppt/slides/slide8.xml><?xml version="1.0" encoding="utf-8"?>
+<p:sld xmlns:a="http://schemas.openxmlformats.org/drawingml/2006/main" xmlns:r="http://schemas.openxmlformats.org/officeDocument/2006/relationships" xmlns:p="http://schemas.openxmlformats.org/presentationml/2006/main">
+  <p:cSld>
+    <p:spTree>
+      <p:nvGrpSpPr>
+        <p:cNvPr id="1" name=""/>
+        <p:cNvGrpSpPr/>
+        <p:nvPr/>
+      </p:nvGrpSpPr>
+      <p:grpSpPr>
+        <a:xfrm>
+          <a:off x="0" y="0"/>
+          <a:ext cx="0" cy="0"/>
+          <a:chOff x="0" y="0"/>
+          <a:chExt cx="0" cy="0"/>
+        </a:xfrm>
+      </p:grpSpPr>
+      <p:sp>
+        <p:nvSpPr>
+          <p:cNvPr id="2" name="Title 1"/>
+          <p:cNvSpPr>
+            <a:spLocks noGrp="1"/>
+          </p:cNvSpPr>
+          <p:nvPr>
+            <p:ph type="title"/>
+          </p:nvPr>
+        </p:nvSpPr>
+        <p:spPr/>
+        <p:txBody>
+          <a:bodyPr>
+            <a:normAutofit fontScale="90000"/>
+          </a:bodyPr>
+          <a:lstStyle/>
+          <a:p>
+            <a:r>
+              <a:rPr lang="en-US" dirty="0"/>
+              <a:t>Varignon's Theorem Worked Example</a:t>
+            </a:r>
+          </a:p>
+        </p:txBody>
+      </p:sp>
+      <p:sp>
+        <p:nvSpPr>
+          <p:cNvPr id="3" name="Content Placeholder 2"/>
+          <p:cNvSpPr>
+            <a:spLocks noGrp="1"/>
+          </p:cNvSpPr>
+          <p:nvPr>
+            <p:ph idx="1"/>
+          </p:nvPr>
+        </p:nvSpPr>
+        <p:spPr>
+          <a:xfrm>
+            <a:off x="457200" y="1600201"/>
+            <a:ext cx="8143876" cy="1527632"/>
+          </a:xfrm>
+        </p:spPr>
+        <p:txBody>
+          <a:bodyPr>
+            <a:normAutofit lnSpcReduction="10000"/>
+          </a:bodyPr>
+          <a:lstStyle/>
+          <a:p>
+            <a:r>
+              <a:rPr lang="en-US" dirty="0"/>
+              <a:t>Use Varignon's Theorem to determine the moment that the force shown below exerts about the base of the post at point O.</a:t>
+            </a:r>
+          </a:p>
+        </p:txBody>
+      </p:sp>
+      <p:sp>
+        <p:nvSpPr>
+          <p:cNvPr id="4" name="Rectangle: Rounded Corners 3">
+            <a:extLst>
+              <a:ext uri="{FF2B5EF4-FFF2-40B4-BE49-F238E27FC236}">
+                <a16:creationId xmlns:a16="http://schemas.microsoft.com/office/drawing/2014/main" id="{A0935343-A4E3-432F-8AB7-FE545BB3E149}"/>
+              </a:ext>
+            </a:extLst>
+          </p:cNvPr>
+          <p:cNvSpPr/>
+          <p:nvPr/>
+        </p:nvSpPr>
+        <p:spPr>
+          <a:xfrm rot="19418562" flipH="1">
+            <a:off x="3868175" y="3531174"/>
+            <a:ext cx="304800" cy="3124200"/>
+          </a:xfrm>
+          <a:prstGeom prst="roundRect">
+            <a:avLst>
+              <a:gd name="adj" fmla="val 50000"/>
+            </a:avLst>
+          </a:prstGeom>
+        </p:spPr>
+        <p:style>
+          <a:lnRef idx="1">
+            <a:schemeClr val="dk1"/>
+          </a:lnRef>
+          <a:fillRef idx="2">
+            <a:schemeClr val="dk1"/>
+          </a:fillRef>
+          <a:effectRef idx="1">
+            <a:schemeClr val="dk1"/>
+          </a:effectRef>
+          <a:fontRef idx="minor">
+            <a:schemeClr val="dk1"/>
+          </a:fontRef>
+        </p:style>
+        <p:txBody>
+          <a:bodyPr rtlCol="0" anchor="ctr"/>
+          <a:lstStyle/>
+          <a:p>
+            <a:pPr algn="ctr"/>
+            <a:endParaRPr lang="en-US"/>
+          </a:p>
+        </p:txBody>
+      </p:sp>
+      <p:sp>
+        <p:nvSpPr>
+          <p:cNvPr id="5" name="Rectangle 4">
+            <a:extLst>
+              <a:ext uri="{FF2B5EF4-FFF2-40B4-BE49-F238E27FC236}">
+                <a16:creationId xmlns:a16="http://schemas.microsoft.com/office/drawing/2014/main" id="{7710E1E7-154B-4D39-AF51-60ADECECA6A6}"/>
+              </a:ext>
+            </a:extLst>
+          </p:cNvPr>
+          <p:cNvSpPr/>
+          <p:nvPr/>
+        </p:nvSpPr>
+        <p:spPr>
+          <a:xfrm>
+            <a:off x="1219200" y="5935328"/>
+            <a:ext cx="6934200" cy="780386"/>
+          </a:xfrm>
+          <a:prstGeom prst="rect">
+            <a:avLst/>
+          </a:prstGeom>
+          <a:solidFill>
+            <a:schemeClr val="bg2">
+              <a:lumMod val="75000"/>
+            </a:schemeClr>
+          </a:solidFill>
+          <a:ln>
+            <a:solidFill>
+              <a:schemeClr val="bg2">
+                <a:lumMod val="50000"/>
+              </a:schemeClr>
+            </a:solidFill>
+          </a:ln>
+        </p:spPr>
+        <p:style>
+          <a:lnRef idx="2">
+            <a:schemeClr val="accent6">
+              <a:shade val="50000"/>
+            </a:schemeClr>
+          </a:lnRef>
+          <a:fillRef idx="1">
+            <a:schemeClr val="accent6"/>
+          </a:fillRef>
+          <a:effectRef idx="0">
+            <a:schemeClr val="accent6"/>
+          </a:effectRef>
+          <a:fontRef idx="minor">
+            <a:schemeClr val="lt1"/>
+          </a:fontRef>
+        </p:style>
+        <p:txBody>
+          <a:bodyPr rtlCol="0" anchor="ctr"/>
+          <a:lstStyle/>
+          <a:p>
+            <a:pPr algn="ctr"/>
+            <a:endParaRPr lang="en-US"/>
+          </a:p>
+        </p:txBody>
+      </p:sp>
+      <p:sp>
+        <p:nvSpPr>
+          <p:cNvPr id="6" name="Arc 5">
+            <a:extLst>
+              <a:ext uri="{FF2B5EF4-FFF2-40B4-BE49-F238E27FC236}">
+                <a16:creationId xmlns:a16="http://schemas.microsoft.com/office/drawing/2014/main" id="{28A4A9D6-743B-4CF4-8357-62AE1232FA64}"/>
+              </a:ext>
+            </a:extLst>
+          </p:cNvPr>
+          <p:cNvSpPr/>
+          <p:nvPr/>
+        </p:nvSpPr>
+        <p:spPr>
+          <a:xfrm>
+            <a:off x="3733800" y="4991100"/>
+            <a:ext cx="1828800" cy="1828800"/>
+          </a:xfrm>
+          <a:prstGeom prst="arc">
+            <a:avLst>
+              <a:gd name="adj1" fmla="val 10758621"/>
+              <a:gd name="adj2" fmla="val 14020562"/>
+            </a:avLst>
+          </a:prstGeom>
+        </p:spPr>
+        <p:style>
+          <a:lnRef idx="1">
+            <a:schemeClr val="accent1"/>
+          </a:lnRef>
+          <a:fillRef idx="0">
+            <a:schemeClr val="accent1"/>
+          </a:fillRef>
+          <a:effectRef idx="0">
+            <a:schemeClr val="accent1"/>
+          </a:effectRef>
+          <a:fontRef idx="minor">
+            <a:schemeClr val="tx1"/>
+          </a:fontRef>
+        </p:style>
+        <p:txBody>
+          <a:bodyPr rtlCol="0" anchor="ctr"/>
+          <a:lstStyle/>
+          <a:p>
+            <a:pPr algn="ctr"/>
+            <a:endParaRPr lang="en-US"/>
+          </a:p>
+        </p:txBody>
+      </p:sp>
+      <p:sp>
+        <p:nvSpPr>
+          <p:cNvPr id="7" name="Frame 6">
+            <a:extLst>
+              <a:ext uri="{FF2B5EF4-FFF2-40B4-BE49-F238E27FC236}">
+                <a16:creationId xmlns:a16="http://schemas.microsoft.com/office/drawing/2014/main" id="{21750337-5806-4474-8742-8C32C6209E2E}"/>
+              </a:ext>
+            </a:extLst>
+          </p:cNvPr>
+          <p:cNvSpPr/>
+          <p:nvPr/>
+        </p:nvSpPr>
+        <p:spPr>
+          <a:xfrm>
+            <a:off x="952500" y="2988469"/>
+            <a:ext cx="7648576" cy="4005261"/>
+          </a:xfrm>
+          <a:prstGeom prst="frame">
+            <a:avLst>
+              <a:gd name="adj1" fmla="val 19084"/>
+            </a:avLst>
+          </a:prstGeom>
+          <a:ln>
+            <a:noFill/>
+          </a:ln>
+          <a:effectLst>
+            <a:softEdge rad="127000"/>
+          </a:effectLst>
+        </p:spPr>
+        <p:style>
+          <a:lnRef idx="2">
+            <a:schemeClr val="dk1"/>
+          </a:lnRef>
+          <a:fillRef idx="1">
+            <a:schemeClr val="lt1"/>
+          </a:fillRef>
+          <a:effectRef idx="0">
+            <a:schemeClr val="dk1"/>
+          </a:effectRef>
+          <a:fontRef idx="minor">
+            <a:schemeClr val="dk1"/>
+          </a:fontRef>
+        </p:style>
+        <p:txBody>
+          <a:bodyPr rtlCol="0" anchor="ctr"/>
+          <a:lstStyle/>
+          <a:p>
+            <a:pPr algn="ctr"/>
+            <a:endParaRPr lang="en-US" dirty="0">
+              <a:solidFill>
+                <a:schemeClr val="tx1"/>
+              </a:solidFill>
+            </a:endParaRPr>
+          </a:p>
+        </p:txBody>
+      </p:sp>
+      <p:cxnSp>
+        <p:nvCxnSpPr>
+          <p:cNvPr id="10" name="Straight Connector 9">
+            <a:extLst>
+              <a:ext uri="{FF2B5EF4-FFF2-40B4-BE49-F238E27FC236}">
+                <a16:creationId xmlns:a16="http://schemas.microsoft.com/office/drawing/2014/main" id="{40F48226-26D2-4889-BB35-C61ED5A84545}"/>
+              </a:ext>
+            </a:extLst>
+          </p:cNvPr>
+          <p:cNvCxnSpPr>
+            <a:cxnSpLocks/>
+          </p:cNvCxnSpPr>
+          <p:nvPr/>
+        </p:nvCxnSpPr>
+        <p:spPr>
+          <a:xfrm rot="16200000">
+            <a:off x="3344465" y="3115530"/>
+            <a:ext cx="533400" cy="721519"/>
+          </a:xfrm>
+          <a:prstGeom prst="line">
+            <a:avLst/>
+          </a:prstGeom>
+        </p:spPr>
+        <p:style>
+          <a:lnRef idx="1">
+            <a:schemeClr val="accent1"/>
+          </a:lnRef>
+          <a:fillRef idx="0">
+            <a:schemeClr val="accent1"/>
+          </a:fillRef>
+          <a:effectRef idx="0">
+            <a:schemeClr val="accent1"/>
+          </a:effectRef>
+          <a:fontRef idx="minor">
+            <a:schemeClr val="tx1"/>
+          </a:fontRef>
+        </p:style>
+      </p:cxnSp>
+      <p:cxnSp>
+        <p:nvCxnSpPr>
+          <p:cNvPr id="13" name="Straight Connector 12">
+            <a:extLst>
+              <a:ext uri="{FF2B5EF4-FFF2-40B4-BE49-F238E27FC236}">
+                <a16:creationId xmlns:a16="http://schemas.microsoft.com/office/drawing/2014/main" id="{A36FCF72-3521-4999-8BFE-EE892935A2EE}"/>
+              </a:ext>
+            </a:extLst>
+          </p:cNvPr>
+          <p:cNvCxnSpPr>
+            <a:cxnSpLocks/>
+          </p:cNvCxnSpPr>
+          <p:nvPr/>
+        </p:nvCxnSpPr>
+        <p:spPr>
+          <a:xfrm flipV="1">
+            <a:off x="4893468" y="5400839"/>
+            <a:ext cx="669134" cy="481308"/>
+          </a:xfrm>
+          <a:prstGeom prst="line">
+            <a:avLst/>
+          </a:prstGeom>
+        </p:spPr>
+        <p:style>
+          <a:lnRef idx="1">
+            <a:schemeClr val="accent1"/>
+          </a:lnRef>
+          <a:fillRef idx="0">
+            <a:schemeClr val="accent1"/>
+          </a:fillRef>
+          <a:effectRef idx="0">
+            <a:schemeClr val="accent1"/>
+          </a:effectRef>
+          <a:fontRef idx="minor">
+            <a:schemeClr val="tx1"/>
+          </a:fontRef>
+        </p:style>
+      </p:cxnSp>
+      <p:cxnSp>
+        <p:nvCxnSpPr>
+          <p:cNvPr id="14" name="Straight Connector 13">
+            <a:extLst>
+              <a:ext uri="{FF2B5EF4-FFF2-40B4-BE49-F238E27FC236}">
+                <a16:creationId xmlns:a16="http://schemas.microsoft.com/office/drawing/2014/main" id="{03A82A7E-917D-483D-836A-3288D2920673}"/>
+              </a:ext>
+            </a:extLst>
+          </p:cNvPr>
+          <p:cNvCxnSpPr>
+            <a:cxnSpLocks/>
+          </p:cNvCxnSpPr>
+          <p:nvPr/>
+        </p:nvCxnSpPr>
+        <p:spPr>
+          <a:xfrm flipH="1" flipV="1">
+            <a:off x="3662363" y="3447715"/>
+            <a:ext cx="1591865" cy="2167731"/>
+          </a:xfrm>
+          <a:prstGeom prst="line">
+            <a:avLst/>
+          </a:prstGeom>
+        </p:spPr>
+        <p:style>
+          <a:lnRef idx="1">
+            <a:schemeClr val="accent1"/>
+          </a:lnRef>
+          <a:fillRef idx="0">
+            <a:schemeClr val="accent1"/>
+          </a:fillRef>
+          <a:effectRef idx="0">
+            <a:schemeClr val="accent1"/>
+          </a:effectRef>
+          <a:fontRef idx="minor">
+            <a:schemeClr val="tx1"/>
+          </a:fontRef>
+        </p:style>
+      </p:cxnSp>
+      <p:sp>
+        <p:nvSpPr>
+          <p:cNvPr id="21" name="TextBox 20">
+            <a:extLst>
+              <a:ext uri="{FF2B5EF4-FFF2-40B4-BE49-F238E27FC236}">
+                <a16:creationId xmlns:a16="http://schemas.microsoft.com/office/drawing/2014/main" id="{52297AA0-3BA0-4F87-851A-A7067F618C63}"/>
+              </a:ext>
+            </a:extLst>
+          </p:cNvPr>
+          <p:cNvSpPr txBox="1"/>
+          <p:nvPr/>
+        </p:nvSpPr>
+        <p:spPr>
+          <a:xfrm>
+            <a:off x="4215280" y="4355067"/>
+            <a:ext cx="486030" cy="369332"/>
+          </a:xfrm>
+          <a:prstGeom prst="rect">
+            <a:avLst/>
+          </a:prstGeom>
+          <a:solidFill>
+            <a:schemeClr val="bg1"/>
+          </a:solidFill>
+        </p:spPr>
+        <p:txBody>
+          <a:bodyPr wrap="none" rtlCol="0">
+            <a:spAutoFit/>
+          </a:bodyPr>
+          <a:lstStyle/>
+          <a:p>
+            <a:r>
+              <a:rPr lang="en-US" dirty="0">
+                <a:solidFill>
+                  <a:schemeClr val="accent1"/>
+                </a:solidFill>
+              </a:rPr>
+              <a:t>2m</a:t>
+            </a:r>
+          </a:p>
+        </p:txBody>
+      </p:sp>
+      <p:sp>
+        <p:nvSpPr>
+          <p:cNvPr id="23" name="TextBox 22">
+            <a:extLst>
+              <a:ext uri="{FF2B5EF4-FFF2-40B4-BE49-F238E27FC236}">
+                <a16:creationId xmlns:a16="http://schemas.microsoft.com/office/drawing/2014/main" id="{77F235F0-CB75-4804-B07E-18F1B07CE6B9}"/>
+              </a:ext>
+            </a:extLst>
+          </p:cNvPr>
+          <p:cNvSpPr txBox="1"/>
+          <p:nvPr/>
+        </p:nvSpPr>
+        <p:spPr>
+          <a:xfrm>
+            <a:off x="3233340" y="5221389"/>
+            <a:ext cx="500458" cy="369332"/>
+          </a:xfrm>
+          <a:prstGeom prst="rect">
+            <a:avLst/>
+          </a:prstGeom>
+          <a:solidFill>
+            <a:schemeClr val="bg1"/>
+          </a:solidFill>
+        </p:spPr>
+        <p:txBody>
+          <a:bodyPr wrap="none" rtlCol="0">
+            <a:spAutoFit/>
+          </a:bodyPr>
+          <a:lstStyle/>
+          <a:p>
+            <a:r>
+              <a:rPr lang="en-US" dirty="0">
+                <a:solidFill>
+                  <a:schemeClr val="accent1"/>
+                </a:solidFill>
+              </a:rPr>
+              <a:t>65</a:t>
+            </a:r>
+            <a:r>
+              <a:rPr lang="en-US" baseline="30000" dirty="0">
+                <a:solidFill>
+                  <a:schemeClr val="accent1"/>
+                </a:solidFill>
+              </a:rPr>
+              <a:t>o</a:t>
+            </a:r>
+          </a:p>
+        </p:txBody>
+      </p:sp>
+      <p:cxnSp>
+        <p:nvCxnSpPr>
+          <p:cNvPr id="24" name="Straight Arrow Connector 23">
+            <a:extLst>
+              <a:ext uri="{FF2B5EF4-FFF2-40B4-BE49-F238E27FC236}">
+                <a16:creationId xmlns:a16="http://schemas.microsoft.com/office/drawing/2014/main" id="{28CCED4B-FAE8-4E59-B358-569474803C20}"/>
+              </a:ext>
+            </a:extLst>
+          </p:cNvPr>
+          <p:cNvCxnSpPr>
+            <a:cxnSpLocks/>
+          </p:cNvCxnSpPr>
+          <p:nvPr/>
+        </p:nvCxnSpPr>
+        <p:spPr>
+          <a:xfrm>
+            <a:off x="2252664" y="3384383"/>
+            <a:ext cx="838200" cy="466390"/>
+          </a:xfrm>
+          <a:prstGeom prst="straightConnector1">
+            <a:avLst/>
+          </a:prstGeom>
+          <a:ln w="38100" cap="flat" cmpd="sng" algn="ctr">
+            <a:solidFill>
+              <a:srgbClr val="FF0000"/>
+            </a:solidFill>
+            <a:prstDash val="solid"/>
+            <a:round/>
+            <a:headEnd type="none" w="med" len="med"/>
+            <a:tailEnd type="arrow" w="med" len="med"/>
+          </a:ln>
+        </p:spPr>
+        <p:style>
+          <a:lnRef idx="0">
+            <a:scrgbClr r="0" g="0" b="0"/>
+          </a:lnRef>
+          <a:fillRef idx="0">
+            <a:scrgbClr r="0" g="0" b="0"/>
+          </a:fillRef>
+          <a:effectRef idx="0">
+            <a:scrgbClr r="0" g="0" b="0"/>
+          </a:effectRef>
+          <a:fontRef idx="minor">
+            <a:schemeClr val="tx1"/>
+          </a:fontRef>
+        </p:style>
+      </p:cxnSp>
+      <p:sp>
+        <p:nvSpPr>
+          <p:cNvPr id="26" name="TextBox 25">
+            <a:extLst>
+              <a:ext uri="{FF2B5EF4-FFF2-40B4-BE49-F238E27FC236}">
+                <a16:creationId xmlns:a16="http://schemas.microsoft.com/office/drawing/2014/main" id="{A8B21659-E2B1-4E11-A229-77B66C9567B9}"/>
+              </a:ext>
+            </a:extLst>
+          </p:cNvPr>
+          <p:cNvSpPr txBox="1"/>
+          <p:nvPr/>
+        </p:nvSpPr>
+        <p:spPr>
+          <a:xfrm>
+            <a:off x="1697704" y="3032900"/>
+            <a:ext cx="554960" cy="369332"/>
+          </a:xfrm>
+          <a:prstGeom prst="rect">
+            <a:avLst/>
+          </a:prstGeom>
+          <a:noFill/>
+        </p:spPr>
+        <p:txBody>
+          <a:bodyPr wrap="none" rtlCol="0">
+            <a:spAutoFit/>
+          </a:bodyPr>
+          <a:lstStyle/>
+          <a:p>
+            <a:r>
+              <a:rPr lang="en-US" dirty="0">
+                <a:solidFill>
+                  <a:srgbClr val="FF0000"/>
+                </a:solidFill>
+              </a:rPr>
+              <a:t>6kN</a:t>
+            </a:r>
+          </a:p>
+        </p:txBody>
+      </p:sp>
+      <p:sp>
+        <p:nvSpPr>
+          <p:cNvPr id="28" name="Arc 27">
+            <a:extLst>
+              <a:ext uri="{FF2B5EF4-FFF2-40B4-BE49-F238E27FC236}">
+                <a16:creationId xmlns:a16="http://schemas.microsoft.com/office/drawing/2014/main" id="{D6D45946-3F13-489C-B479-19FF3A1EE2AE}"/>
+              </a:ext>
+            </a:extLst>
+          </p:cNvPr>
+          <p:cNvSpPr/>
+          <p:nvPr/>
+        </p:nvSpPr>
+        <p:spPr>
+          <a:xfrm>
+            <a:off x="2552700" y="3362325"/>
+            <a:ext cx="914400" cy="914400"/>
+          </a:xfrm>
+          <a:prstGeom prst="arc">
+            <a:avLst>
+              <a:gd name="adj1" fmla="val 10758621"/>
+              <a:gd name="adj2" fmla="val 12672168"/>
+            </a:avLst>
+          </a:prstGeom>
+        </p:spPr>
+        <p:style>
+          <a:lnRef idx="1">
+            <a:schemeClr val="accent1"/>
+          </a:lnRef>
+          <a:fillRef idx="0">
+            <a:schemeClr val="accent1"/>
+          </a:fillRef>
+          <a:effectRef idx="0">
+            <a:schemeClr val="accent1"/>
+          </a:effectRef>
+          <a:fontRef idx="minor">
+            <a:schemeClr val="tx1"/>
+          </a:fontRef>
+        </p:style>
+        <p:txBody>
+          <a:bodyPr rtlCol="0" anchor="ctr"/>
+          <a:lstStyle/>
+          <a:p>
+            <a:pPr algn="ctr"/>
+            <a:endParaRPr lang="en-US"/>
+          </a:p>
+        </p:txBody>
+      </p:sp>
+      <p:sp>
+        <p:nvSpPr>
+          <p:cNvPr id="29" name="TextBox 28">
+            <a:extLst>
+              <a:ext uri="{FF2B5EF4-FFF2-40B4-BE49-F238E27FC236}">
+                <a16:creationId xmlns:a16="http://schemas.microsoft.com/office/drawing/2014/main" id="{085F24B3-9F12-445C-97C5-4F035F1C1877}"/>
+              </a:ext>
+            </a:extLst>
+          </p:cNvPr>
+          <p:cNvSpPr txBox="1"/>
+          <p:nvPr/>
+        </p:nvSpPr>
+        <p:spPr>
+          <a:xfrm>
+            <a:off x="2100063" y="3528801"/>
+            <a:ext cx="500458" cy="369332"/>
+          </a:xfrm>
+          <a:prstGeom prst="rect">
+            <a:avLst/>
+          </a:prstGeom>
+          <a:noFill/>
+        </p:spPr>
+        <p:txBody>
+          <a:bodyPr wrap="none" rtlCol="0">
+            <a:spAutoFit/>
+          </a:bodyPr>
+          <a:lstStyle/>
+          <a:p>
+            <a:r>
+              <a:rPr lang="en-US" dirty="0">
+                <a:solidFill>
+                  <a:schemeClr val="accent1"/>
+                </a:solidFill>
+              </a:rPr>
+              <a:t>20</a:t>
+            </a:r>
+            <a:r>
+              <a:rPr lang="en-US" baseline="30000" dirty="0">
+                <a:solidFill>
+                  <a:schemeClr val="accent1"/>
+                </a:solidFill>
+              </a:rPr>
+              <a:t>o</a:t>
+            </a:r>
+          </a:p>
+        </p:txBody>
+      </p:sp>
+      <p:cxnSp>
+        <p:nvCxnSpPr>
+          <p:cNvPr id="30" name="Straight Connector 29">
+            <a:extLst>
+              <a:ext uri="{FF2B5EF4-FFF2-40B4-BE49-F238E27FC236}">
+                <a16:creationId xmlns:a16="http://schemas.microsoft.com/office/drawing/2014/main" id="{82BE8EF1-F36A-40A9-9F46-2A567F21D7F5}"/>
+              </a:ext>
+            </a:extLst>
+          </p:cNvPr>
+          <p:cNvCxnSpPr>
+            <a:cxnSpLocks/>
+          </p:cNvCxnSpPr>
+          <p:nvPr/>
+        </p:nvCxnSpPr>
+        <p:spPr>
+          <a:xfrm>
+            <a:off x="2300286" y="3831723"/>
+            <a:ext cx="524472" cy="0"/>
+          </a:xfrm>
+          <a:prstGeom prst="line">
+            <a:avLst/>
+          </a:prstGeom>
+        </p:spPr>
+        <p:style>
+          <a:lnRef idx="1">
+            <a:schemeClr val="accent1"/>
+          </a:lnRef>
+          <a:fillRef idx="0">
+            <a:schemeClr val="accent1"/>
+          </a:fillRef>
+          <a:effectRef idx="0">
+            <a:schemeClr val="accent1"/>
+          </a:effectRef>
+          <a:fontRef idx="minor">
+            <a:schemeClr val="tx1"/>
+          </a:fontRef>
+        </p:style>
+      </p:cxnSp>
+      <p:sp>
+        <p:nvSpPr>
+          <p:cNvPr id="4096" name="TextBox 4095">
+            <a:extLst>
+              <a:ext uri="{FF2B5EF4-FFF2-40B4-BE49-F238E27FC236}">
+                <a16:creationId xmlns:a16="http://schemas.microsoft.com/office/drawing/2014/main" id="{F0E78BF6-6FCC-4F18-AF10-7BDCD4858689}"/>
+              </a:ext>
+            </a:extLst>
+          </p:cNvPr>
+          <p:cNvSpPr txBox="1"/>
+          <p:nvPr/>
+        </p:nvSpPr>
+        <p:spPr>
+          <a:xfrm>
+            <a:off x="4458292" y="5917168"/>
+            <a:ext cx="336952" cy="369332"/>
+          </a:xfrm>
+          <a:prstGeom prst="rect">
+            <a:avLst/>
+          </a:prstGeom>
+          <a:noFill/>
+        </p:spPr>
+        <p:txBody>
+          <a:bodyPr wrap="none" rtlCol="0">
+            <a:spAutoFit/>
+          </a:bodyPr>
+          <a:lstStyle/>
+          <a:p>
+            <a:r>
+              <a:rPr lang="en-US" dirty="0"/>
+              <a:t>O</a:t>
+            </a:r>
+          </a:p>
+        </p:txBody>
+      </p:sp>
+    </p:spTree>
+    <p:extLst>
+      <p:ext uri="{BB962C8B-B14F-4D97-AF65-F5344CB8AC3E}">
+        <p14:creationId xmlns:p14="http://schemas.microsoft.com/office/powerpoint/2010/main" val="2962569113"/>
       </p:ext>
     </p:extLst>
   </p:cSld>
@@ -7481,6 +8229,21 @@
 </file>
 
 <file path=customXml/item1.xml><?xml version="1.0" encoding="utf-8"?>
+<p:properties xmlns:p="http://schemas.microsoft.com/office/2006/metadata/properties" xmlns:xsi="http://www.w3.org/2001/XMLSchema-instance" xmlns:pc="http://schemas.microsoft.com/office/infopath/2007/PartnerControls">
+  <documentManagement/>
+</p:properties>
+</file>
+
+<file path=customXml/item2.xml><?xml version="1.0" encoding="utf-8"?>
+<?mso-contentType ?>
+<FormTemplates xmlns="http://schemas.microsoft.com/sharepoint/v3/contenttype/forms">
+  <Display>DocumentLibraryForm</Display>
+  <Edit>DocumentLibraryForm</Edit>
+  <New>DocumentLibraryForm</New>
+</FormTemplates>
+</file>
+
+<file path=customXml/item3.xml><?xml version="1.0" encoding="utf-8"?>
 <ct:contentTypeSchema xmlns:ct="http://schemas.microsoft.com/office/2006/metadata/contentType" xmlns:ma="http://schemas.microsoft.com/office/2006/metadata/properties/metaAttributes" ct:_="" ma:_="" ma:contentTypeName="Document" ma:contentTypeID="0x010100A06DF21F5BB2734A800ED30F3F452129" ma:contentTypeVersion="12" ma:contentTypeDescription="Create a new document." ma:contentTypeScope="" ma:versionID="544d96a5fbac5de9d5d902b535c73fb2">
   <xsd:schema xmlns:xsd="http://www.w3.org/2001/XMLSchema" xmlns:xs="http://www.w3.org/2001/XMLSchema" xmlns:p="http://schemas.microsoft.com/office/2006/metadata/properties" xmlns:ns3="90d05cb5-950f-4f68-bc2c-e17794455b92" xmlns:ns4="b4eab9fa-dbb0-4082-8491-8bd54207a265" targetNamespace="http://schemas.microsoft.com/office/2006/metadata/properties" ma:root="true" ma:fieldsID="7a710efc71c2169bf9c05e5a40dddf12" ns3:_="" ns4:_="">
     <xsd:import namespace="90d05cb5-950f-4f68-bc2c-e17794455b92"/>
@@ -7697,22 +8460,32 @@
 </ct:contentTypeSchema>
 </file>
 
-<file path=customXml/item2.xml><?xml version="1.0" encoding="utf-8"?>
-<?mso-contentType ?>
-<FormTemplates xmlns="http://schemas.microsoft.com/sharepoint/v3/contenttype/forms">
-  <Display>DocumentLibraryForm</Display>
-  <Edit>DocumentLibraryForm</Edit>
-  <New>DocumentLibraryForm</New>
-</FormTemplates>
+<file path=customXml/itemProps1.xml><?xml version="1.0" encoding="utf-8"?>
+<ds:datastoreItem xmlns:ds="http://schemas.openxmlformats.org/officeDocument/2006/customXml" ds:itemID="{52EB1464-66D1-425A-BBB5-7A9312BBE9C4}">
+  <ds:schemaRefs>
+    <ds:schemaRef ds:uri="http://purl.org/dc/terms/"/>
+    <ds:schemaRef ds:uri="http://schemas.openxmlformats.org/package/2006/metadata/core-properties"/>
+    <ds:schemaRef ds:uri="http://schemas.microsoft.com/office/2006/documentManagement/types"/>
+    <ds:schemaRef ds:uri="90d05cb5-950f-4f68-bc2c-e17794455b92"/>
+    <ds:schemaRef ds:uri="http://purl.org/dc/elements/1.1/"/>
+    <ds:schemaRef ds:uri="http://schemas.microsoft.com/office/2006/metadata/properties"/>
+    <ds:schemaRef ds:uri="http://schemas.microsoft.com/office/infopath/2007/PartnerControls"/>
+    <ds:schemaRef ds:uri="b4eab9fa-dbb0-4082-8491-8bd54207a265"/>
+    <ds:schemaRef ds:uri="http://www.w3.org/XML/1998/namespace"/>
+    <ds:schemaRef ds:uri="http://purl.org/dc/dcmitype/"/>
+  </ds:schemaRefs>
+</ds:datastoreItem>
 </file>
 
-<file path=customXml/item3.xml><?xml version="1.0" encoding="utf-8"?>
-<p:properties xmlns:p="http://schemas.microsoft.com/office/2006/metadata/properties" xmlns:xsi="http://www.w3.org/2001/XMLSchema-instance" xmlns:pc="http://schemas.microsoft.com/office/infopath/2007/PartnerControls">
-  <documentManagement/>
-</p:properties>
+<file path=customXml/itemProps2.xml><?xml version="1.0" encoding="utf-8"?>
+<ds:datastoreItem xmlns:ds="http://schemas.openxmlformats.org/officeDocument/2006/customXml" ds:itemID="{F5CF5F32-56DC-4068-8B04-457CF34A96F3}">
+  <ds:schemaRefs>
+    <ds:schemaRef ds:uri="http://schemas.microsoft.com/sharepoint/v3/contenttype/forms"/>
+  </ds:schemaRefs>
+</ds:datastoreItem>
 </file>
 
-<file path=customXml/itemProps1.xml><?xml version="1.0" encoding="utf-8"?>
+<file path=customXml/itemProps3.xml><?xml version="1.0" encoding="utf-8"?>
 <ds:datastoreItem xmlns:ds="http://schemas.openxmlformats.org/officeDocument/2006/customXml" ds:itemID="{A43B8A4B-79FE-4529-931C-D64224FA70E3}">
   <ds:schemaRefs>
     <ds:schemaRef ds:uri="http://schemas.microsoft.com/office/2006/metadata/contentType"/>
@@ -7729,29 +8502,4 @@
     <ds:schemaRef ds:uri="http://schemas.microsoft.com/internal/obd"/>
   </ds:schemaRefs>
 </ds:datastoreItem>
-</file>
-
-<file path=customXml/itemProps2.xml><?xml version="1.0" encoding="utf-8"?>
-<ds:datastoreItem xmlns:ds="http://schemas.openxmlformats.org/officeDocument/2006/customXml" ds:itemID="{F5CF5F32-56DC-4068-8B04-457CF34A96F3}">
-  <ds:schemaRefs>
-    <ds:schemaRef ds:uri="http://schemas.microsoft.com/sharepoint/v3/contenttype/forms"/>
-  </ds:schemaRefs>
-</ds:datastoreItem>
-</file>
-
-<file path=customXml/itemProps3.xml><?xml version="1.0" encoding="utf-8"?>
-<ds:datastoreItem xmlns:ds="http://schemas.openxmlformats.org/officeDocument/2006/customXml" ds:itemID="{52EB1464-66D1-425A-BBB5-7A9312BBE9C4}">
-  <ds:schemaRefs>
-    <ds:schemaRef ds:uri="http://purl.org/dc/terms/"/>
-    <ds:schemaRef ds:uri="http://schemas.openxmlformats.org/package/2006/metadata/core-properties"/>
-    <ds:schemaRef ds:uri="http://schemas.microsoft.com/office/2006/documentManagement/types"/>
-    <ds:schemaRef ds:uri="90d05cb5-950f-4f68-bc2c-e17794455b92"/>
-    <ds:schemaRef ds:uri="http://purl.org/dc/elements/1.1/"/>
-    <ds:schemaRef ds:uri="http://schemas.microsoft.com/office/2006/metadata/properties"/>
-    <ds:schemaRef ds:uri="http://schemas.microsoft.com/office/infopath/2007/PartnerControls"/>
-    <ds:schemaRef ds:uri="b4eab9fa-dbb0-4082-8491-8bd54207a265"/>
-    <ds:schemaRef ds:uri="http://www.w3.org/XML/1998/namespace"/>
-    <ds:schemaRef ds:uri="http://purl.org/dc/dcmitype/"/>
-  </ds:schemaRefs>
-</ds:datastoreItem>
 </file>
</xml_diff>